<commit_message>
EK diagramm első verzió, regisztráció egyben (gazdi-menhely)
</commit_message>
<xml_diff>
--- a/EK diagram.pptx
+++ b/EK diagram.pptx
@@ -116,7 +116,6 @@
 <p1510:revInfo xmlns:a="http://schemas.openxmlformats.org/drawingml/2006/main" xmlns:r="http://schemas.openxmlformats.org/officeDocument/2006/relationships" xmlns:p1510="http://schemas.microsoft.com/office/powerpoint/2015/10/main">
   <p1510:revLst>
     <p1510:client id="{8E81162A-2967-4512-9C48-C57FE8BD8C0F}" v="373" dt="2022-01-23T21:25:55.668"/>
-    <p1510:client id="{C994F5C8-AA65-16EA-59B5-2C1AEC3CB577}" v="92" dt="2022-01-24T21:17:16.862"/>
   </p1510:revLst>
 </p1510:revInfo>
 </file>
@@ -250,7 +249,7 @@
           <a:p>
             <a:fld id="{F5F1901C-D33B-4565-A7E4-5DF903098DB6}" type="datetimeFigureOut">
               <a:rPr lang="hu-HU" smtClean="0"/>
-              <a:t>2022. 01. 24.</a:t>
+              <a:t>2022. 01. 23.</a:t>
             </a:fld>
             <a:endParaRPr lang="hu-HU"/>
           </a:p>
@@ -418,7 +417,7 @@
           <a:p>
             <a:fld id="{F5F1901C-D33B-4565-A7E4-5DF903098DB6}" type="datetimeFigureOut">
               <a:rPr lang="hu-HU" smtClean="0"/>
-              <a:t>2022. 01. 24.</a:t>
+              <a:t>2022. 01. 23.</a:t>
             </a:fld>
             <a:endParaRPr lang="hu-HU"/>
           </a:p>
@@ -596,7 +595,7 @@
           <a:p>
             <a:fld id="{F5F1901C-D33B-4565-A7E4-5DF903098DB6}" type="datetimeFigureOut">
               <a:rPr lang="hu-HU" smtClean="0"/>
-              <a:t>2022. 01. 24.</a:t>
+              <a:t>2022. 01. 23.</a:t>
             </a:fld>
             <a:endParaRPr lang="hu-HU"/>
           </a:p>
@@ -764,7 +763,7 @@
           <a:p>
             <a:fld id="{F5F1901C-D33B-4565-A7E4-5DF903098DB6}" type="datetimeFigureOut">
               <a:rPr lang="hu-HU" smtClean="0"/>
-              <a:t>2022. 01. 24.</a:t>
+              <a:t>2022. 01. 23.</a:t>
             </a:fld>
             <a:endParaRPr lang="hu-HU"/>
           </a:p>
@@ -1009,7 +1008,7 @@
           <a:p>
             <a:fld id="{F5F1901C-D33B-4565-A7E4-5DF903098DB6}" type="datetimeFigureOut">
               <a:rPr lang="hu-HU" smtClean="0"/>
-              <a:t>2022. 01. 24.</a:t>
+              <a:t>2022. 01. 23.</a:t>
             </a:fld>
             <a:endParaRPr lang="hu-HU"/>
           </a:p>
@@ -1238,7 +1237,7 @@
           <a:p>
             <a:fld id="{F5F1901C-D33B-4565-A7E4-5DF903098DB6}" type="datetimeFigureOut">
               <a:rPr lang="hu-HU" smtClean="0"/>
-              <a:t>2022. 01. 24.</a:t>
+              <a:t>2022. 01. 23.</a:t>
             </a:fld>
             <a:endParaRPr lang="hu-HU"/>
           </a:p>
@@ -1602,7 +1601,7 @@
           <a:p>
             <a:fld id="{F5F1901C-D33B-4565-A7E4-5DF903098DB6}" type="datetimeFigureOut">
               <a:rPr lang="hu-HU" smtClean="0"/>
-              <a:t>2022. 01. 24.</a:t>
+              <a:t>2022. 01. 23.</a:t>
             </a:fld>
             <a:endParaRPr lang="hu-HU"/>
           </a:p>
@@ -1719,7 +1718,7 @@
           <a:p>
             <a:fld id="{F5F1901C-D33B-4565-A7E4-5DF903098DB6}" type="datetimeFigureOut">
               <a:rPr lang="hu-HU" smtClean="0"/>
-              <a:t>2022. 01. 24.</a:t>
+              <a:t>2022. 01. 23.</a:t>
             </a:fld>
             <a:endParaRPr lang="hu-HU"/>
           </a:p>
@@ -1814,7 +1813,7 @@
           <a:p>
             <a:fld id="{F5F1901C-D33B-4565-A7E4-5DF903098DB6}" type="datetimeFigureOut">
               <a:rPr lang="hu-HU" smtClean="0"/>
-              <a:t>2022. 01. 24.</a:t>
+              <a:t>2022. 01. 23.</a:t>
             </a:fld>
             <a:endParaRPr lang="hu-HU"/>
           </a:p>
@@ -2089,7 +2088,7 @@
           <a:p>
             <a:fld id="{F5F1901C-D33B-4565-A7E4-5DF903098DB6}" type="datetimeFigureOut">
               <a:rPr lang="hu-HU" smtClean="0"/>
-              <a:t>2022. 01. 24.</a:t>
+              <a:t>2022. 01. 23.</a:t>
             </a:fld>
             <a:endParaRPr lang="hu-HU"/>
           </a:p>
@@ -2341,7 +2340,7 @@
           <a:p>
             <a:fld id="{F5F1901C-D33B-4565-A7E4-5DF903098DB6}" type="datetimeFigureOut">
               <a:rPr lang="hu-HU" smtClean="0"/>
-              <a:t>2022. 01. 24.</a:t>
+              <a:t>2022. 01. 23.</a:t>
             </a:fld>
             <a:endParaRPr lang="hu-HU"/>
           </a:p>
@@ -2552,7 +2551,7 @@
           <a:p>
             <a:fld id="{F5F1901C-D33B-4565-A7E4-5DF903098DB6}" type="datetimeFigureOut">
               <a:rPr lang="hu-HU" smtClean="0"/>
-              <a:t>2022. 01. 24.</a:t>
+              <a:t>2022. 01. 23.</a:t>
             </a:fld>
             <a:endParaRPr lang="hu-HU"/>
           </a:p>
@@ -2971,7 +2970,7 @@
         </p:nvSpPr>
         <p:spPr>
           <a:xfrm>
-            <a:off x="1066800" y="1617134"/>
+            <a:off x="1013884" y="1595967"/>
             <a:ext cx="2211915" cy="825499"/>
           </a:xfrm>
           <a:prstGeom prst="rect">
@@ -3166,7 +3165,7 @@
         <p:spPr>
           <a:xfrm>
             <a:off x="3130551" y="2410883"/>
-            <a:ext cx="1718733" cy="1390650"/>
+            <a:ext cx="1581150" cy="1263650"/>
           </a:xfrm>
           <a:prstGeom prst="straightConnector1">
             <a:avLst/>
@@ -3204,8 +3203,8 @@
         </p:nvSpPr>
         <p:spPr>
           <a:xfrm>
-            <a:off x="4321176" y="3273425"/>
-            <a:ext cx="3280831" cy="1820333"/>
+            <a:off x="4321176" y="3284008"/>
+            <a:ext cx="3280831" cy="1206500"/>
           </a:xfrm>
           <a:prstGeom prst="diamond">
             <a:avLst/>
@@ -3226,7 +3225,7 @@
           </a:fontRef>
         </p:style>
         <p:txBody>
-          <a:bodyPr lIns="91440" tIns="45720" rIns="91440" bIns="45720" rtlCol="0" anchor="ctr"/>
+          <a:bodyPr rtlCol="0" anchor="ctr"/>
           <a:lstStyle/>
           <a:p>
             <a:pPr algn="ctr"/>
@@ -3234,7 +3233,7 @@
               <a:rPr lang="hu-HU" dirty="0">
                 <a:cs typeface="Calibri"/>
               </a:rPr>
-              <a:t>Adat lekérdezés, felrögzítés, mentés</a:t>
+              <a:t>Adat lekérdezés, felrögzítés</a:t>
             </a:r>
             <a:endParaRPr lang="hu-HU" dirty="0" err="1"/>
           </a:p>
@@ -3254,8 +3253,8 @@
         </p:nvCxnSpPr>
         <p:spPr>
           <a:xfrm flipH="1">
-            <a:off x="6965950" y="2675467"/>
-            <a:ext cx="1096433" cy="1136650"/>
+            <a:off x="7050616" y="2675467"/>
+            <a:ext cx="990601" cy="1009650"/>
           </a:xfrm>
           <a:prstGeom prst="straightConnector1">
             <a:avLst/>
@@ -3565,7 +3564,7 @@
         </p:nvSpPr>
         <p:spPr>
           <a:xfrm>
-            <a:off x="4871507" y="3220508"/>
+            <a:off x="5993341" y="1760008"/>
             <a:ext cx="1005417" cy="508000"/>
           </a:xfrm>
           <a:prstGeom prst="ellipse">
@@ -3592,20 +3591,13 @@
           <a:p>
             <a:pPr algn="ctr"/>
             <a:r>
-              <a:rPr lang="hu-HU" sz="1000" u="sng" dirty="0">
-                <a:ea typeface="+mn-lt"/>
-                <a:cs typeface="+mn-lt"/>
-              </a:rPr>
-              <a:t>Menhely </a:t>
-            </a:r>
-            <a:r>
-              <a:rPr lang="hu-HU" sz="1000" u="sng" dirty="0" err="1">
+              <a:rPr lang="hu-HU" sz="1000" dirty="0" err="1">
                 <a:ea typeface="+mn-lt"/>
                 <a:cs typeface="+mn-lt"/>
               </a:rPr>
               <a:t>usernév</a:t>
             </a:r>
-            <a:endParaRPr lang="hu-HU" sz="1000" u="sng" dirty="0" err="1">
+            <a:endParaRPr lang="hu-HU" sz="1000">
               <a:cs typeface="Calibri"/>
             </a:endParaRPr>
           </a:p>
@@ -3820,10 +3812,10 @@
       </p:sp>
       <p:sp>
         <p:nvSpPr>
-          <p:cNvPr id="20" name="Ellipszis 19">
+          <p:cNvPr id="19" name="Ellipszis 18">
             <a:extLst>
               <a:ext uri="{FF2B5EF4-FFF2-40B4-BE49-F238E27FC236}">
-                <a16:creationId xmlns:a16="http://schemas.microsoft.com/office/drawing/2014/main" id="{9B57E1F2-6825-486C-AB23-9D067557BCF7}"/>
+                <a16:creationId xmlns:a16="http://schemas.microsoft.com/office/drawing/2014/main" id="{D6611A95-CAC5-4195-9570-1F01FA5EB0D0}"/>
               </a:ext>
             </a:extLst>
           </p:cNvPr>
@@ -3832,8 +3824,8 @@
         </p:nvSpPr>
         <p:spPr>
           <a:xfrm>
-            <a:off x="10448924" y="5379508"/>
-            <a:ext cx="1005417" cy="508000"/>
+            <a:off x="1273174" y="3125258"/>
+            <a:ext cx="1005417" cy="592666"/>
           </a:xfrm>
           <a:prstGeom prst="ellipse">
             <a:avLst/>
@@ -3859,21 +3851,23 @@
           <a:p>
             <a:pPr algn="ctr"/>
             <a:r>
-              <a:rPr lang="hu-HU" sz="1000" dirty="0">
+              <a:rPr lang="en-US" sz="1000" dirty="0" err="1">
                 <a:cs typeface="Calibri"/>
               </a:rPr>
-              <a:t>táblanév</a:t>
-            </a:r>
-            <a:endParaRPr lang="hu-HU" sz="1000" dirty="0"/>
-          </a:p>
-        </p:txBody>
-      </p:sp>
-      <p:sp>
-        <p:nvSpPr>
-          <p:cNvPr id="21" name="Ellipszis 20">
+              <a:t>megye</a:t>
+            </a:r>
+            <a:endParaRPr lang="en-US" sz="1000">
+              <a:cs typeface="Calibri"/>
+            </a:endParaRPr>
+          </a:p>
+        </p:txBody>
+      </p:sp>
+      <p:sp>
+        <p:nvSpPr>
+          <p:cNvPr id="20" name="Ellipszis 19">
             <a:extLst>
               <a:ext uri="{FF2B5EF4-FFF2-40B4-BE49-F238E27FC236}">
-                <a16:creationId xmlns:a16="http://schemas.microsoft.com/office/drawing/2014/main" id="{D8BFAE07-B367-429E-8892-5ABE6B105FB5}"/>
+                <a16:creationId xmlns:a16="http://schemas.microsoft.com/office/drawing/2014/main" id="{9B57E1F2-6825-486C-AB23-9D067557BCF7}"/>
               </a:ext>
             </a:extLst>
           </p:cNvPr>
@@ -3882,7 +3876,7 @@
         </p:nvSpPr>
         <p:spPr>
           <a:xfrm>
-            <a:off x="9168342" y="5929841"/>
+            <a:off x="10448924" y="5379508"/>
             <a:ext cx="1005417" cy="508000"/>
           </a:xfrm>
           <a:prstGeom prst="ellipse">
@@ -3912,7 +3906,7 @@
               <a:rPr lang="hu-HU" sz="1000" dirty="0">
                 <a:cs typeface="Calibri"/>
               </a:rPr>
-              <a:t>jelszó</a:t>
+              <a:t>táblanév</a:t>
             </a:r>
             <a:endParaRPr lang="hu-HU" sz="1000" dirty="0"/>
           </a:p>
@@ -3920,10 +3914,10 @@
       </p:sp>
       <p:sp>
         <p:nvSpPr>
-          <p:cNvPr id="22" name="Ellipszis 21">
+          <p:cNvPr id="21" name="Ellipszis 20">
             <a:extLst>
               <a:ext uri="{FF2B5EF4-FFF2-40B4-BE49-F238E27FC236}">
-                <a16:creationId xmlns:a16="http://schemas.microsoft.com/office/drawing/2014/main" id="{00626DBF-07C8-4CAB-8017-8E6A0B37FEFB}"/>
+                <a16:creationId xmlns:a16="http://schemas.microsoft.com/office/drawing/2014/main" id="{D8BFAE07-B367-429E-8892-5ABE6B105FB5}"/>
               </a:ext>
             </a:extLst>
           </p:cNvPr>
@@ -3932,8 +3926,8 @@
         </p:nvSpPr>
         <p:spPr>
           <a:xfrm>
-            <a:off x="7972424" y="5993342"/>
-            <a:ext cx="878417" cy="381000"/>
+            <a:off x="9168342" y="5929841"/>
+            <a:ext cx="1005417" cy="508000"/>
           </a:xfrm>
           <a:prstGeom prst="ellipse">
             <a:avLst/>
@@ -3959,6 +3953,56 @@
           <a:p>
             <a:pPr algn="ctr"/>
             <a:r>
+              <a:rPr lang="hu-HU" sz="1000" dirty="0">
+                <a:cs typeface="Calibri"/>
+              </a:rPr>
+              <a:t>jelszó</a:t>
+            </a:r>
+            <a:endParaRPr lang="hu-HU" sz="1000" dirty="0"/>
+          </a:p>
+        </p:txBody>
+      </p:sp>
+      <p:sp>
+        <p:nvSpPr>
+          <p:cNvPr id="22" name="Ellipszis 21">
+            <a:extLst>
+              <a:ext uri="{FF2B5EF4-FFF2-40B4-BE49-F238E27FC236}">
+                <a16:creationId xmlns:a16="http://schemas.microsoft.com/office/drawing/2014/main" id="{00626DBF-07C8-4CAB-8017-8E6A0B37FEFB}"/>
+              </a:ext>
+            </a:extLst>
+          </p:cNvPr>
+          <p:cNvSpPr/>
+          <p:nvPr/>
+        </p:nvSpPr>
+        <p:spPr>
+          <a:xfrm>
+            <a:off x="7972424" y="5993342"/>
+            <a:ext cx="878417" cy="381000"/>
+          </a:xfrm>
+          <a:prstGeom prst="ellipse">
+            <a:avLst/>
+          </a:prstGeom>
+        </p:spPr>
+        <p:style>
+          <a:lnRef idx="2">
+            <a:schemeClr val="accent3"/>
+          </a:lnRef>
+          <a:fillRef idx="1">
+            <a:schemeClr val="lt1"/>
+          </a:fillRef>
+          <a:effectRef idx="0">
+            <a:schemeClr val="accent3"/>
+          </a:effectRef>
+          <a:fontRef idx="minor">
+            <a:schemeClr val="dk1"/>
+          </a:fontRef>
+        </p:style>
+        <p:txBody>
+          <a:bodyPr lIns="91440" tIns="45720" rIns="91440" bIns="45720" rtlCol="0" anchor="ctr"/>
+          <a:lstStyle/>
+          <a:p>
+            <a:pPr algn="ctr"/>
+            <a:r>
               <a:rPr lang="hu-HU" sz="1000" dirty="0" err="1">
                 <a:ea typeface="+mn-lt"/>
                 <a:cs typeface="+mn-lt"/>
@@ -3966,6 +4010,43 @@
               <a:t>usernév</a:t>
             </a:r>
             <a:endParaRPr lang="hu-HU" sz="1000" dirty="0" err="1"/>
+          </a:p>
+        </p:txBody>
+      </p:sp>
+      <p:sp>
+        <p:nvSpPr>
+          <p:cNvPr id="23" name="Szövegdoboz 22">
+            <a:extLst>
+              <a:ext uri="{FF2B5EF4-FFF2-40B4-BE49-F238E27FC236}">
+                <a16:creationId xmlns:a16="http://schemas.microsoft.com/office/drawing/2014/main" id="{E2B6F4CE-1671-4415-8793-10E3BC4352E1}"/>
+              </a:ext>
+            </a:extLst>
+          </p:cNvPr>
+          <p:cNvSpPr txBox="1"/>
+          <p:nvPr/>
+        </p:nvSpPr>
+        <p:spPr>
+          <a:xfrm>
+            <a:off x="4724400" y="3200400"/>
+            <a:ext cx="2743200" cy="369332"/>
+          </a:xfrm>
+          <a:prstGeom prst="rect">
+            <a:avLst/>
+          </a:prstGeom>
+          <a:noFill/>
+        </p:spPr>
+        <p:txBody>
+          <a:bodyPr rot="0" spcFirstLastPara="0" vertOverflow="overflow" horzOverflow="overflow" vert="horz" wrap="square" lIns="91440" tIns="45720" rIns="91440" bIns="45720" numCol="1" spcCol="0" rtlCol="0" fromWordArt="0" anchor="t" anchorCtr="0" forceAA="0" compatLnSpc="1">
+            <a:prstTxWarp prst="textNoShape">
+              <a:avLst/>
+            </a:prstTxWarp>
+            <a:spAutoFit/>
+          </a:bodyPr>
+          <a:lstStyle/>
+          <a:p>
+            <a:endParaRPr lang="en-US" dirty="0">
+              <a:cs typeface="Calibri"/>
+            </a:endParaRPr>
           </a:p>
         </p:txBody>
       </p:sp>
@@ -3983,7 +4064,7 @@
         </p:nvSpPr>
         <p:spPr>
           <a:xfrm>
-            <a:off x="4745567" y="2438400"/>
+            <a:off x="4724400" y="3200400"/>
             <a:ext cx="2743200" cy="369332"/>
           </a:xfrm>
           <a:prstGeom prst="rect">
@@ -4000,6 +4081,58 @@
           </a:bodyPr>
           <a:lstStyle/>
           <a:p>
+            <a:endParaRPr lang="en-US" dirty="0">
+              <a:cs typeface="Calibri"/>
+            </a:endParaRPr>
+          </a:p>
+        </p:txBody>
+      </p:sp>
+      <p:sp>
+        <p:nvSpPr>
+          <p:cNvPr id="25" name="Ellipszis 24">
+            <a:extLst>
+              <a:ext uri="{FF2B5EF4-FFF2-40B4-BE49-F238E27FC236}">
+                <a16:creationId xmlns:a16="http://schemas.microsoft.com/office/drawing/2014/main" id="{0E56332D-0BF2-4BD6-8DDE-D702A196D902}"/>
+              </a:ext>
+            </a:extLst>
+          </p:cNvPr>
+          <p:cNvSpPr/>
+          <p:nvPr/>
+        </p:nvSpPr>
+        <p:spPr>
+          <a:xfrm>
+            <a:off x="267757" y="2479674"/>
+            <a:ext cx="1005417" cy="508000"/>
+          </a:xfrm>
+          <a:prstGeom prst="ellipse">
+            <a:avLst/>
+          </a:prstGeom>
+        </p:spPr>
+        <p:style>
+          <a:lnRef idx="2">
+            <a:schemeClr val="accent3"/>
+          </a:lnRef>
+          <a:fillRef idx="1">
+            <a:schemeClr val="lt1"/>
+          </a:fillRef>
+          <a:effectRef idx="0">
+            <a:schemeClr val="accent3"/>
+          </a:effectRef>
+          <a:fontRef idx="minor">
+            <a:schemeClr val="dk1"/>
+          </a:fontRef>
+        </p:style>
+        <p:txBody>
+          <a:bodyPr lIns="91440" tIns="45720" rIns="91440" bIns="45720" rtlCol="0" anchor="ctr"/>
+          <a:lstStyle/>
+          <a:p>
+            <a:pPr algn="ctr"/>
+            <a:r>
+              <a:rPr lang="en-US" sz="1000" dirty="0" err="1">
+                <a:cs typeface="Calibri"/>
+              </a:rPr>
+              <a:t>város</a:t>
+            </a:r>
             <a:endParaRPr lang="en-US" dirty="0">
               <a:cs typeface="Calibri"/>
             </a:endParaRPr>
@@ -4532,8 +4665,8 @@
         </p:nvCxnSpPr>
         <p:spPr>
           <a:xfrm flipV="1">
-            <a:off x="992716" y="2453215"/>
-            <a:ext cx="338667" cy="560918"/>
+            <a:off x="1214966" y="2389715"/>
+            <a:ext cx="455083" cy="275168"/>
           </a:xfrm>
           <a:prstGeom prst="straightConnector1">
             <a:avLst/>
@@ -4569,9 +4702,9 @@
           <p:nvPr/>
         </p:nvCxnSpPr>
         <p:spPr>
-          <a:xfrm flipH="1" flipV="1">
-            <a:off x="1098550" y="3289298"/>
-            <a:ext cx="476250" cy="518584"/>
+          <a:xfrm flipH="1">
+            <a:off x="2093383" y="2453216"/>
+            <a:ext cx="127001" cy="804332"/>
           </a:xfrm>
           <a:prstGeom prst="straightConnector1">
             <a:avLst/>
@@ -4683,9 +4816,9 @@
           <p:nvPr/>
         </p:nvCxnSpPr>
         <p:spPr>
-          <a:xfrm flipV="1">
-            <a:off x="3215215" y="5289550"/>
-            <a:ext cx="5027083" cy="328083"/>
+          <a:xfrm>
+            <a:off x="6951132" y="1998133"/>
+            <a:ext cx="963083" cy="328083"/>
           </a:xfrm>
           <a:prstGeom prst="straightConnector1">
             <a:avLst/>
@@ -5010,231 +5143,6 @@
           </a:fontRef>
         </p:style>
       </p:cxnSp>
-      <p:sp>
-        <p:nvSpPr>
-          <p:cNvPr id="39" name="Téglalap 38">
-            <a:extLst>
-              <a:ext uri="{FF2B5EF4-FFF2-40B4-BE49-F238E27FC236}">
-                <a16:creationId xmlns:a16="http://schemas.microsoft.com/office/drawing/2014/main" id="{FCBA8BC1-4415-48FE-AAA2-6ABAAD2493A0}"/>
-              </a:ext>
-            </a:extLst>
-          </p:cNvPr>
-          <p:cNvSpPr/>
-          <p:nvPr/>
-        </p:nvSpPr>
-        <p:spPr>
-          <a:xfrm>
-            <a:off x="1320800" y="5183717"/>
-            <a:ext cx="1894416" cy="910166"/>
-          </a:xfrm>
-          <a:prstGeom prst="rect">
-            <a:avLst/>
-          </a:prstGeom>
-        </p:spPr>
-        <p:style>
-          <a:lnRef idx="2">
-            <a:schemeClr val="accent5"/>
-          </a:lnRef>
-          <a:fillRef idx="1">
-            <a:schemeClr val="lt1"/>
-          </a:fillRef>
-          <a:effectRef idx="0">
-            <a:schemeClr val="accent5"/>
-          </a:effectRef>
-          <a:fontRef idx="minor">
-            <a:schemeClr val="dk1"/>
-          </a:fontRef>
-        </p:style>
-        <p:txBody>
-          <a:bodyPr rtlCol="0" anchor="ctr"/>
-          <a:lstStyle/>
-          <a:p>
-            <a:pPr algn="ctr"/>
-            <a:r>
-              <a:rPr lang="hu-HU" sz="1200" dirty="0">
-                <a:cs typeface="Calibri"/>
-              </a:rPr>
-              <a:t>Hírek, örökbefogadott kutyák, adományozási lehetőségek</a:t>
-            </a:r>
-          </a:p>
-        </p:txBody>
-      </p:sp>
-      <p:sp>
-        <p:nvSpPr>
-          <p:cNvPr id="51" name="Téglalap 50">
-            <a:extLst>
-              <a:ext uri="{FF2B5EF4-FFF2-40B4-BE49-F238E27FC236}">
-                <a16:creationId xmlns:a16="http://schemas.microsoft.com/office/drawing/2014/main" id="{CA32A8B0-3279-49E7-B321-39129403D4C3}"/>
-              </a:ext>
-            </a:extLst>
-          </p:cNvPr>
-          <p:cNvSpPr/>
-          <p:nvPr/>
-        </p:nvSpPr>
-        <p:spPr>
-          <a:xfrm>
-            <a:off x="267759" y="3019425"/>
-            <a:ext cx="910166" cy="910166"/>
-          </a:xfrm>
-          <a:prstGeom prst="rect">
-            <a:avLst/>
-          </a:prstGeom>
-        </p:spPr>
-        <p:style>
-          <a:lnRef idx="2">
-            <a:schemeClr val="accent5"/>
-          </a:lnRef>
-          <a:fillRef idx="1">
-            <a:schemeClr val="lt1"/>
-          </a:fillRef>
-          <a:effectRef idx="0">
-            <a:schemeClr val="accent5"/>
-          </a:effectRef>
-          <a:fontRef idx="minor">
-            <a:schemeClr val="dk1"/>
-          </a:fontRef>
-        </p:style>
-        <p:txBody>
-          <a:bodyPr rtlCol="0" anchor="ctr"/>
-          <a:lstStyle/>
-          <a:p>
-            <a:pPr algn="ctr"/>
-            <a:r>
-              <a:rPr lang="en-US" sz="1200" b="0" i="0" u="none" strike="noStrike" dirty="0" err="1">
-                <a:solidFill>
-                  <a:srgbClr val="000000"/>
-                </a:solidFill>
-                <a:latin typeface="Calibri"/>
-                <a:ea typeface="Calibri"/>
-                <a:cs typeface="Calibri"/>
-              </a:rPr>
-              <a:t>megye</a:t>
-            </a:r>
-            <a:endParaRPr lang="hu-HU">
-              <a:cs typeface="Calibri" panose="020F0502020204030204"/>
-            </a:endParaRPr>
-          </a:p>
-        </p:txBody>
-      </p:sp>
-      <p:sp>
-        <p:nvSpPr>
-          <p:cNvPr id="52" name="Téglalap 51">
-            <a:extLst>
-              <a:ext uri="{FF2B5EF4-FFF2-40B4-BE49-F238E27FC236}">
-                <a16:creationId xmlns:a16="http://schemas.microsoft.com/office/drawing/2014/main" id="{218061AF-925F-4107-BC40-DF036D7F08A5}"/>
-              </a:ext>
-            </a:extLst>
-          </p:cNvPr>
-          <p:cNvSpPr/>
-          <p:nvPr/>
-        </p:nvSpPr>
-        <p:spPr>
-          <a:xfrm>
-            <a:off x="1564217" y="3522133"/>
-            <a:ext cx="910166" cy="910166"/>
-          </a:xfrm>
-          <a:prstGeom prst="rect">
-            <a:avLst/>
-          </a:prstGeom>
-        </p:spPr>
-        <p:style>
-          <a:lnRef idx="2">
-            <a:schemeClr val="accent5"/>
-          </a:lnRef>
-          <a:fillRef idx="1">
-            <a:schemeClr val="lt1"/>
-          </a:fillRef>
-          <a:effectRef idx="0">
-            <a:schemeClr val="accent5"/>
-          </a:effectRef>
-          <a:fontRef idx="minor">
-            <a:schemeClr val="dk1"/>
-          </a:fontRef>
-        </p:style>
-        <p:txBody>
-          <a:bodyPr rtlCol="0" anchor="ctr"/>
-          <a:lstStyle/>
-          <a:p>
-            <a:pPr algn="ctr"/>
-            <a:r>
-              <a:rPr lang="hu-HU" sz="1200" dirty="0">
-                <a:cs typeface="Calibri"/>
-              </a:rPr>
-              <a:t>város</a:t>
-            </a:r>
-            <a:endParaRPr lang="hu-HU" sz="1200">
-              <a:cs typeface="Calibri"/>
-            </a:endParaRPr>
-          </a:p>
-        </p:txBody>
-      </p:sp>
-      <p:sp>
-        <p:nvSpPr>
-          <p:cNvPr id="53" name="Ellipszis 52">
-            <a:extLst>
-              <a:ext uri="{FF2B5EF4-FFF2-40B4-BE49-F238E27FC236}">
-                <a16:creationId xmlns:a16="http://schemas.microsoft.com/office/drawing/2014/main" id="{AB2E7447-D7F6-4DC2-BC8A-043CDE2EDBB1}"/>
-              </a:ext>
-            </a:extLst>
-          </p:cNvPr>
-          <p:cNvSpPr/>
-          <p:nvPr/>
-        </p:nvSpPr>
-        <p:spPr>
-          <a:xfrm>
-            <a:off x="5940424" y="3178175"/>
-            <a:ext cx="1153583" cy="508000"/>
-          </a:xfrm>
-          <a:prstGeom prst="ellipse">
-            <a:avLst/>
-          </a:prstGeom>
-        </p:spPr>
-        <p:style>
-          <a:lnRef idx="2">
-            <a:schemeClr val="accent3"/>
-          </a:lnRef>
-          <a:fillRef idx="1">
-            <a:schemeClr val="lt1"/>
-          </a:fillRef>
-          <a:effectRef idx="0">
-            <a:schemeClr val="accent3"/>
-          </a:effectRef>
-          <a:fontRef idx="minor">
-            <a:schemeClr val="dk1"/>
-          </a:fontRef>
-        </p:style>
-        <p:txBody>
-          <a:bodyPr lIns="91440" tIns="45720" rIns="91440" bIns="45720" rtlCol="0" anchor="ctr"/>
-          <a:lstStyle/>
-          <a:p>
-            <a:pPr algn="ctr"/>
-            <a:r>
-              <a:rPr lang="hu-HU" sz="1000" u="sng" dirty="0">
-                <a:ea typeface="+mn-lt"/>
-                <a:cs typeface="+mn-lt"/>
-              </a:rPr>
-              <a:t>Kutya egyed ID</a:t>
-            </a:r>
-            <a:r>
-              <a:rPr lang="hu-HU" u="sng" dirty="0">
-                <a:ea typeface="+mn-lt"/>
-                <a:cs typeface="+mn-lt"/>
-              </a:rPr>
-              <a:t>-</a:t>
-            </a:r>
-            <a:r>
-              <a:rPr lang="hu-HU" sz="1000" u="sng" dirty="0">
-                <a:ea typeface="+mn-lt"/>
-                <a:cs typeface="+mn-lt"/>
-              </a:rPr>
-              <a:t>ja</a:t>
-            </a:r>
-            <a:endParaRPr lang="hu-HU" sz="1000" u="sng">
-              <a:cs typeface="Calibri" panose="020F0502020204030204"/>
-            </a:endParaRPr>
-          </a:p>
-        </p:txBody>
-      </p:sp>
     </p:spTree>
     <p:extLst>
       <p:ext uri="{BB962C8B-B14F-4D97-AF65-F5344CB8AC3E}">

</xml_diff>